<commit_message>
update simulation study figures
</commit_message>
<xml_diff>
--- a/analyses/simulation_study/Figures/Figure1.pptx
+++ b/analyses/simulation_study/Figures/Figure1.pptx
@@ -2,7 +2,7 @@
 <file path=ppt/presentation.xml><?xml version="1.0" encoding="utf-8"?>
 <p:presentation xmlns:a="http://schemas.openxmlformats.org/drawingml/2006/main" xmlns:r="http://schemas.openxmlformats.org/officeDocument/2006/relationships" xmlns:p="http://schemas.openxmlformats.org/presentationml/2006/main" saveSubsetFonts="1" autoCompressPictures="0">
   <p:sldMasterIdLst>
-    <p:sldMasterId id="2147483804" r:id="rId1"/>
+    <p:sldMasterId id="2147483852" r:id="rId1"/>
   </p:sldMasterIdLst>
   <p:notesMasterIdLst>
     <p:notesMasterId r:id="rId3"/>
@@ -10,14 +10,14 @@
   <p:sldIdLst>
     <p:sldId id="256" r:id="rId2"/>
   </p:sldIdLst>
-  <p:sldSz cx="2160588" cy="5759450"/>
+  <p:sldSz cx="1439863" cy="2519363"/>
   <p:notesSz cx="6858000" cy="9144000"/>
   <p:defaultTextStyle>
     <a:defPPr>
       <a:defRPr lang="en-US"/>
     </a:defPPr>
-    <a:lvl1pPr marL="0" algn="l" defTabSz="522488" rtl="0" eaLnBrk="1" latinLnBrk="0" hangingPunct="1">
-      <a:defRPr sz="1029" kern="1200">
+    <a:lvl1pPr marL="0" algn="l" defTabSz="326503" rtl="0" eaLnBrk="1" latinLnBrk="0" hangingPunct="1">
+      <a:defRPr sz="643" kern="1200">
         <a:solidFill>
           <a:schemeClr val="tx1"/>
         </a:solidFill>
@@ -26,8 +26,8 @@
         <a:cs typeface="+mn-cs"/>
       </a:defRPr>
     </a:lvl1pPr>
-    <a:lvl2pPr marL="261244" algn="l" defTabSz="522488" rtl="0" eaLnBrk="1" latinLnBrk="0" hangingPunct="1">
-      <a:defRPr sz="1029" kern="1200">
+    <a:lvl2pPr marL="163251" algn="l" defTabSz="326503" rtl="0" eaLnBrk="1" latinLnBrk="0" hangingPunct="1">
+      <a:defRPr sz="643" kern="1200">
         <a:solidFill>
           <a:schemeClr val="tx1"/>
         </a:solidFill>
@@ -36,8 +36,8 @@
         <a:cs typeface="+mn-cs"/>
       </a:defRPr>
     </a:lvl2pPr>
-    <a:lvl3pPr marL="522488" algn="l" defTabSz="522488" rtl="0" eaLnBrk="1" latinLnBrk="0" hangingPunct="1">
-      <a:defRPr sz="1029" kern="1200">
+    <a:lvl3pPr marL="326503" algn="l" defTabSz="326503" rtl="0" eaLnBrk="1" latinLnBrk="0" hangingPunct="1">
+      <a:defRPr sz="643" kern="1200">
         <a:solidFill>
           <a:schemeClr val="tx1"/>
         </a:solidFill>
@@ -46,8 +46,8 @@
         <a:cs typeface="+mn-cs"/>
       </a:defRPr>
     </a:lvl3pPr>
-    <a:lvl4pPr marL="783732" algn="l" defTabSz="522488" rtl="0" eaLnBrk="1" latinLnBrk="0" hangingPunct="1">
-      <a:defRPr sz="1029" kern="1200">
+    <a:lvl4pPr marL="489754" algn="l" defTabSz="326503" rtl="0" eaLnBrk="1" latinLnBrk="0" hangingPunct="1">
+      <a:defRPr sz="643" kern="1200">
         <a:solidFill>
           <a:schemeClr val="tx1"/>
         </a:solidFill>
@@ -56,8 +56,8 @@
         <a:cs typeface="+mn-cs"/>
       </a:defRPr>
     </a:lvl4pPr>
-    <a:lvl5pPr marL="1044976" algn="l" defTabSz="522488" rtl="0" eaLnBrk="1" latinLnBrk="0" hangingPunct="1">
-      <a:defRPr sz="1029" kern="1200">
+    <a:lvl5pPr marL="653006" algn="l" defTabSz="326503" rtl="0" eaLnBrk="1" latinLnBrk="0" hangingPunct="1">
+      <a:defRPr sz="643" kern="1200">
         <a:solidFill>
           <a:schemeClr val="tx1"/>
         </a:solidFill>
@@ -66,8 +66,8 @@
         <a:cs typeface="+mn-cs"/>
       </a:defRPr>
     </a:lvl5pPr>
-    <a:lvl6pPr marL="1306220" algn="l" defTabSz="522488" rtl="0" eaLnBrk="1" latinLnBrk="0" hangingPunct="1">
-      <a:defRPr sz="1029" kern="1200">
+    <a:lvl6pPr marL="816257" algn="l" defTabSz="326503" rtl="0" eaLnBrk="1" latinLnBrk="0" hangingPunct="1">
+      <a:defRPr sz="643" kern="1200">
         <a:solidFill>
           <a:schemeClr val="tx1"/>
         </a:solidFill>
@@ -76,8 +76,8 @@
         <a:cs typeface="+mn-cs"/>
       </a:defRPr>
     </a:lvl6pPr>
-    <a:lvl7pPr marL="1567464" algn="l" defTabSz="522488" rtl="0" eaLnBrk="1" latinLnBrk="0" hangingPunct="1">
-      <a:defRPr sz="1029" kern="1200">
+    <a:lvl7pPr marL="979508" algn="l" defTabSz="326503" rtl="0" eaLnBrk="1" latinLnBrk="0" hangingPunct="1">
+      <a:defRPr sz="643" kern="1200">
         <a:solidFill>
           <a:schemeClr val="tx1"/>
         </a:solidFill>
@@ -86,8 +86,8 @@
         <a:cs typeface="+mn-cs"/>
       </a:defRPr>
     </a:lvl7pPr>
-    <a:lvl8pPr marL="1828709" algn="l" defTabSz="522488" rtl="0" eaLnBrk="1" latinLnBrk="0" hangingPunct="1">
-      <a:defRPr sz="1029" kern="1200">
+    <a:lvl8pPr marL="1142760" algn="l" defTabSz="326503" rtl="0" eaLnBrk="1" latinLnBrk="0" hangingPunct="1">
+      <a:defRPr sz="643" kern="1200">
         <a:solidFill>
           <a:schemeClr val="tx1"/>
         </a:solidFill>
@@ -96,8 +96,8 @@
         <a:cs typeface="+mn-cs"/>
       </a:defRPr>
     </a:lvl8pPr>
-    <a:lvl9pPr marL="2089953" algn="l" defTabSz="522488" rtl="0" eaLnBrk="1" latinLnBrk="0" hangingPunct="1">
-      <a:defRPr sz="1029" kern="1200">
+    <a:lvl9pPr marL="1306012" algn="l" defTabSz="326503" rtl="0" eaLnBrk="1" latinLnBrk="0" hangingPunct="1">
+      <a:defRPr sz="643" kern="1200">
         <a:solidFill>
           <a:schemeClr val="tx1"/>
         </a:solidFill>
@@ -110,12 +110,12 @@
   <p:extLst>
     <p:ext uri="{EFAFB233-063F-42B5-8137-9DF3F51BA10A}">
       <p15:sldGuideLst xmlns:p15="http://schemas.microsoft.com/office/powerpoint/2012/main">
-        <p15:guide id="2" pos="1361" userDrawn="1">
+        <p15:guide id="2" pos="907" userDrawn="1">
           <p15:clr>
             <a:srgbClr val="A4A3A4"/>
           </p15:clr>
         </p15:guide>
-        <p15:guide id="3" orient="horz" pos="1814" userDrawn="1">
+        <p15:guide id="3" orient="horz" pos="794" userDrawn="1">
           <p15:clr>
             <a:srgbClr val="A4A3A4"/>
           </p15:clr>
@@ -208,7 +208,7 @@
           <a:p>
             <a:fld id="{492B434E-06E5-C04E-8A07-1BEEDCD66FF0}" type="datetimeFigureOut">
               <a:rPr lang="en-US" smtClean="0"/>
-              <a:t>11/13/18</a:t>
+              <a:t>11/29/18</a:t>
             </a:fld>
             <a:endParaRPr lang="en-US"/>
           </a:p>
@@ -226,8 +226,8 @@
         </p:nvSpPr>
         <p:spPr>
           <a:xfrm>
-            <a:off x="2851150" y="1143000"/>
-            <a:ext cx="1155700" cy="3086100"/>
+            <a:off x="2547938" y="1143000"/>
+            <a:ext cx="1762125" cy="3086100"/>
           </a:xfrm>
           <a:prstGeom prst="rect">
             <a:avLst/>
@@ -381,8 +381,8 @@
   </p:cSld>
   <p:clrMap bg1="lt1" tx1="dk1" bg2="lt2" tx2="dk2" accent1="accent1" accent2="accent2" accent3="accent3" accent4="accent4" accent5="accent5" accent6="accent6" hlink="hlink" folHlink="folHlink"/>
   <p:notesStyle>
-    <a:lvl1pPr marL="0" algn="l" defTabSz="522488" rtl="0" eaLnBrk="1" latinLnBrk="0" hangingPunct="1">
-      <a:defRPr sz="686" kern="1200">
+    <a:lvl1pPr marL="0" algn="l" defTabSz="326503" rtl="0" eaLnBrk="1" latinLnBrk="0" hangingPunct="1">
+      <a:defRPr sz="429" kern="1200">
         <a:solidFill>
           <a:schemeClr val="tx1"/>
         </a:solidFill>
@@ -391,8 +391,8 @@
         <a:cs typeface="+mn-cs"/>
       </a:defRPr>
     </a:lvl1pPr>
-    <a:lvl2pPr marL="261244" algn="l" defTabSz="522488" rtl="0" eaLnBrk="1" latinLnBrk="0" hangingPunct="1">
-      <a:defRPr sz="686" kern="1200">
+    <a:lvl2pPr marL="163251" algn="l" defTabSz="326503" rtl="0" eaLnBrk="1" latinLnBrk="0" hangingPunct="1">
+      <a:defRPr sz="429" kern="1200">
         <a:solidFill>
           <a:schemeClr val="tx1"/>
         </a:solidFill>
@@ -401,8 +401,8 @@
         <a:cs typeface="+mn-cs"/>
       </a:defRPr>
     </a:lvl2pPr>
-    <a:lvl3pPr marL="522488" algn="l" defTabSz="522488" rtl="0" eaLnBrk="1" latinLnBrk="0" hangingPunct="1">
-      <a:defRPr sz="686" kern="1200">
+    <a:lvl3pPr marL="326503" algn="l" defTabSz="326503" rtl="0" eaLnBrk="1" latinLnBrk="0" hangingPunct="1">
+      <a:defRPr sz="429" kern="1200">
         <a:solidFill>
           <a:schemeClr val="tx1"/>
         </a:solidFill>
@@ -411,8 +411,8 @@
         <a:cs typeface="+mn-cs"/>
       </a:defRPr>
     </a:lvl3pPr>
-    <a:lvl4pPr marL="783732" algn="l" defTabSz="522488" rtl="0" eaLnBrk="1" latinLnBrk="0" hangingPunct="1">
-      <a:defRPr sz="686" kern="1200">
+    <a:lvl4pPr marL="489754" algn="l" defTabSz="326503" rtl="0" eaLnBrk="1" latinLnBrk="0" hangingPunct="1">
+      <a:defRPr sz="429" kern="1200">
         <a:solidFill>
           <a:schemeClr val="tx1"/>
         </a:solidFill>
@@ -421,8 +421,8 @@
         <a:cs typeface="+mn-cs"/>
       </a:defRPr>
     </a:lvl4pPr>
-    <a:lvl5pPr marL="1044976" algn="l" defTabSz="522488" rtl="0" eaLnBrk="1" latinLnBrk="0" hangingPunct="1">
-      <a:defRPr sz="686" kern="1200">
+    <a:lvl5pPr marL="653006" algn="l" defTabSz="326503" rtl="0" eaLnBrk="1" latinLnBrk="0" hangingPunct="1">
+      <a:defRPr sz="429" kern="1200">
         <a:solidFill>
           <a:schemeClr val="tx1"/>
         </a:solidFill>
@@ -431,8 +431,8 @@
         <a:cs typeface="+mn-cs"/>
       </a:defRPr>
     </a:lvl5pPr>
-    <a:lvl6pPr marL="1306220" algn="l" defTabSz="522488" rtl="0" eaLnBrk="1" latinLnBrk="0" hangingPunct="1">
-      <a:defRPr sz="686" kern="1200">
+    <a:lvl6pPr marL="816257" algn="l" defTabSz="326503" rtl="0" eaLnBrk="1" latinLnBrk="0" hangingPunct="1">
+      <a:defRPr sz="429" kern="1200">
         <a:solidFill>
           <a:schemeClr val="tx1"/>
         </a:solidFill>
@@ -441,8 +441,8 @@
         <a:cs typeface="+mn-cs"/>
       </a:defRPr>
     </a:lvl6pPr>
-    <a:lvl7pPr marL="1567464" algn="l" defTabSz="522488" rtl="0" eaLnBrk="1" latinLnBrk="0" hangingPunct="1">
-      <a:defRPr sz="686" kern="1200">
+    <a:lvl7pPr marL="979508" algn="l" defTabSz="326503" rtl="0" eaLnBrk="1" latinLnBrk="0" hangingPunct="1">
+      <a:defRPr sz="429" kern="1200">
         <a:solidFill>
           <a:schemeClr val="tx1"/>
         </a:solidFill>
@@ -451,8 +451,8 @@
         <a:cs typeface="+mn-cs"/>
       </a:defRPr>
     </a:lvl7pPr>
-    <a:lvl8pPr marL="1828709" algn="l" defTabSz="522488" rtl="0" eaLnBrk="1" latinLnBrk="0" hangingPunct="1">
-      <a:defRPr sz="686" kern="1200">
+    <a:lvl8pPr marL="1142760" algn="l" defTabSz="326503" rtl="0" eaLnBrk="1" latinLnBrk="0" hangingPunct="1">
+      <a:defRPr sz="429" kern="1200">
         <a:solidFill>
           <a:schemeClr val="tx1"/>
         </a:solidFill>
@@ -461,8 +461,8 @@
         <a:cs typeface="+mn-cs"/>
       </a:defRPr>
     </a:lvl8pPr>
-    <a:lvl9pPr marL="2089953" algn="l" defTabSz="522488" rtl="0" eaLnBrk="1" latinLnBrk="0" hangingPunct="1">
-      <a:defRPr sz="686" kern="1200">
+    <a:lvl9pPr marL="1306012" algn="l" defTabSz="326503" rtl="0" eaLnBrk="1" latinLnBrk="0" hangingPunct="1">
+      <a:defRPr sz="429" kern="1200">
         <a:solidFill>
           <a:schemeClr val="tx1"/>
         </a:solidFill>
@@ -504,15 +504,15 @@
         </p:nvSpPr>
         <p:spPr>
           <a:xfrm>
-            <a:off x="162044" y="942577"/>
-            <a:ext cx="1836500" cy="2005142"/>
+            <a:off x="107990" y="412312"/>
+            <a:ext cx="1223884" cy="877112"/>
           </a:xfrm>
         </p:spPr>
         <p:txBody>
           <a:bodyPr anchor="b"/>
           <a:lstStyle>
             <a:lvl1pPr algn="ctr">
-              <a:defRPr sz="1418"/>
+              <a:defRPr sz="945"/>
             </a:lvl1pPr>
           </a:lstStyle>
           <a:p>
@@ -536,8 +536,8 @@
         </p:nvSpPr>
         <p:spPr>
           <a:xfrm>
-            <a:off x="270074" y="3025045"/>
-            <a:ext cx="1620441" cy="1390533"/>
+            <a:off x="179983" y="1323249"/>
+            <a:ext cx="1079897" cy="608263"/>
           </a:xfrm>
         </p:spPr>
         <p:txBody>
@@ -545,39 +545,39 @@
           <a:lstStyle>
             <a:lvl1pPr marL="0" indent="0" algn="ctr">
               <a:buNone/>
-              <a:defRPr sz="567"/>
+              <a:defRPr sz="378"/>
             </a:lvl1pPr>
-            <a:lvl2pPr marL="108036" indent="0" algn="ctr">
-              <a:buNone/>
-              <a:defRPr sz="473"/>
+            <a:lvl2pPr marL="72009" indent="0" algn="ctr">
+              <a:buNone/>
+              <a:defRPr sz="315"/>
             </a:lvl2pPr>
-            <a:lvl3pPr marL="216073" indent="0" algn="ctr">
-              <a:buNone/>
-              <a:defRPr sz="425"/>
+            <a:lvl3pPr marL="144018" indent="0" algn="ctr">
+              <a:buNone/>
+              <a:defRPr sz="284"/>
             </a:lvl3pPr>
-            <a:lvl4pPr marL="324109" indent="0" algn="ctr">
-              <a:buNone/>
-              <a:defRPr sz="378"/>
+            <a:lvl4pPr marL="216027" indent="0" algn="ctr">
+              <a:buNone/>
+              <a:defRPr sz="252"/>
             </a:lvl4pPr>
-            <a:lvl5pPr marL="432145" indent="0" algn="ctr">
-              <a:buNone/>
-              <a:defRPr sz="378"/>
+            <a:lvl5pPr marL="288036" indent="0" algn="ctr">
+              <a:buNone/>
+              <a:defRPr sz="252"/>
             </a:lvl5pPr>
-            <a:lvl6pPr marL="540182" indent="0" algn="ctr">
-              <a:buNone/>
-              <a:defRPr sz="378"/>
+            <a:lvl6pPr marL="360045" indent="0" algn="ctr">
+              <a:buNone/>
+              <a:defRPr sz="252"/>
             </a:lvl6pPr>
-            <a:lvl7pPr marL="648218" indent="0" algn="ctr">
-              <a:buNone/>
-              <a:defRPr sz="378"/>
+            <a:lvl7pPr marL="432054" indent="0" algn="ctr">
+              <a:buNone/>
+              <a:defRPr sz="252"/>
             </a:lvl7pPr>
-            <a:lvl8pPr marL="756255" indent="0" algn="ctr">
-              <a:buNone/>
-              <a:defRPr sz="378"/>
+            <a:lvl8pPr marL="504063" indent="0" algn="ctr">
+              <a:buNone/>
+              <a:defRPr sz="252"/>
             </a:lvl8pPr>
-            <a:lvl9pPr marL="864291" indent="0" algn="ctr">
-              <a:buNone/>
-              <a:defRPr sz="378"/>
+            <a:lvl9pPr marL="576072" indent="0" algn="ctr">
+              <a:buNone/>
+              <a:defRPr sz="252"/>
             </a:lvl9pPr>
           </a:lstStyle>
           <a:p>
@@ -606,7 +606,7 @@
           <a:p>
             <a:fld id="{0B9902DC-4CBB-8F49-BEE0-02C2C3D473E5}" type="datetimeFigureOut">
               <a:rPr lang="en-US" smtClean="0"/>
-              <a:t>11/13/18</a:t>
+              <a:t>11/29/18</a:t>
             </a:fld>
             <a:endParaRPr lang="en-US"/>
           </a:p>
@@ -657,7 +657,7 @@
     </p:spTree>
     <p:extLst>
       <p:ext uri="{BB962C8B-B14F-4D97-AF65-F5344CB8AC3E}">
-        <p14:creationId xmlns:p14="http://schemas.microsoft.com/office/powerpoint/2010/main" val="321618417"/>
+        <p14:creationId xmlns:p14="http://schemas.microsoft.com/office/powerpoint/2010/main" val="2115821050"/>
       </p:ext>
     </p:extLst>
   </p:cSld>
@@ -776,7 +776,7 @@
           <a:p>
             <a:fld id="{0B9902DC-4CBB-8F49-BEE0-02C2C3D473E5}" type="datetimeFigureOut">
               <a:rPr lang="en-US" smtClean="0"/>
-              <a:t>11/13/18</a:t>
+              <a:t>11/29/18</a:t>
             </a:fld>
             <a:endParaRPr lang="en-US"/>
           </a:p>
@@ -827,7 +827,7 @@
     </p:spTree>
     <p:extLst>
       <p:ext uri="{BB962C8B-B14F-4D97-AF65-F5344CB8AC3E}">
-        <p14:creationId xmlns:p14="http://schemas.microsoft.com/office/powerpoint/2010/main" val="2582293856"/>
+        <p14:creationId xmlns:p14="http://schemas.microsoft.com/office/powerpoint/2010/main" val="3133058697"/>
       </p:ext>
     </p:extLst>
   </p:cSld>
@@ -866,8 +866,8 @@
         </p:nvSpPr>
         <p:spPr>
           <a:xfrm>
-            <a:off x="1546171" y="306637"/>
-            <a:ext cx="465877" cy="4880868"/>
+            <a:off x="1030402" y="134133"/>
+            <a:ext cx="310470" cy="2135044"/>
           </a:xfrm>
         </p:spPr>
         <p:txBody>
@@ -894,8 +894,8 @@
         </p:nvSpPr>
         <p:spPr>
           <a:xfrm>
-            <a:off x="148541" y="306637"/>
-            <a:ext cx="1370623" cy="4880868"/>
+            <a:off x="98991" y="134133"/>
+            <a:ext cx="913413" cy="2135044"/>
           </a:xfrm>
         </p:spPr>
         <p:txBody>
@@ -956,7 +956,7 @@
           <a:p>
             <a:fld id="{0B9902DC-4CBB-8F49-BEE0-02C2C3D473E5}" type="datetimeFigureOut">
               <a:rPr lang="en-US" smtClean="0"/>
-              <a:t>11/13/18</a:t>
+              <a:t>11/29/18</a:t>
             </a:fld>
             <a:endParaRPr lang="en-US"/>
           </a:p>
@@ -1007,7 +1007,7 @@
     </p:spTree>
     <p:extLst>
       <p:ext uri="{BB962C8B-B14F-4D97-AF65-F5344CB8AC3E}">
-        <p14:creationId xmlns:p14="http://schemas.microsoft.com/office/powerpoint/2010/main" val="561200697"/>
+        <p14:creationId xmlns:p14="http://schemas.microsoft.com/office/powerpoint/2010/main" val="3711291970"/>
       </p:ext>
     </p:extLst>
   </p:cSld>
@@ -1126,7 +1126,7 @@
           <a:p>
             <a:fld id="{0B9902DC-4CBB-8F49-BEE0-02C2C3D473E5}" type="datetimeFigureOut">
               <a:rPr lang="en-US" smtClean="0"/>
-              <a:t>11/13/18</a:t>
+              <a:t>11/29/18</a:t>
             </a:fld>
             <a:endParaRPr lang="en-US"/>
           </a:p>
@@ -1177,7 +1177,7 @@
     </p:spTree>
     <p:extLst>
       <p:ext uri="{BB962C8B-B14F-4D97-AF65-F5344CB8AC3E}">
-        <p14:creationId xmlns:p14="http://schemas.microsoft.com/office/powerpoint/2010/main" val="1060966504"/>
+        <p14:creationId xmlns:p14="http://schemas.microsoft.com/office/powerpoint/2010/main" val="4101893331"/>
       </p:ext>
     </p:extLst>
   </p:cSld>
@@ -1216,15 +1216,15 @@
         </p:nvSpPr>
         <p:spPr>
           <a:xfrm>
-            <a:off x="147415" y="1435864"/>
-            <a:ext cx="1863507" cy="2395771"/>
+            <a:off x="98241" y="628092"/>
+            <a:ext cx="1241882" cy="1047985"/>
           </a:xfrm>
         </p:spPr>
         <p:txBody>
           <a:bodyPr anchor="b"/>
           <a:lstStyle>
             <a:lvl1pPr>
-              <a:defRPr sz="1418"/>
+              <a:defRPr sz="945"/>
             </a:lvl1pPr>
           </a:lstStyle>
           <a:p>
@@ -1248,8 +1248,8 @@
         </p:nvSpPr>
         <p:spPr>
           <a:xfrm>
-            <a:off x="147415" y="3854300"/>
-            <a:ext cx="1863507" cy="1259879"/>
+            <a:off x="98241" y="1685991"/>
+            <a:ext cx="1241882" cy="551110"/>
           </a:xfrm>
         </p:spPr>
         <p:txBody>
@@ -1257,15 +1257,15 @@
           <a:lstStyle>
             <a:lvl1pPr marL="0" indent="0">
               <a:buNone/>
-              <a:defRPr sz="567">
+              <a:defRPr sz="378">
                 <a:solidFill>
                   <a:schemeClr val="tx1"/>
                 </a:solidFill>
               </a:defRPr>
             </a:lvl1pPr>
-            <a:lvl2pPr marL="108036" indent="0">
-              <a:buNone/>
-              <a:defRPr sz="473">
+            <a:lvl2pPr marL="72009" indent="0">
+              <a:buNone/>
+              <a:defRPr sz="315">
                 <a:solidFill>
                   <a:schemeClr val="tx1">
                     <a:tint val="75000"/>
@@ -1273,9 +1273,9 @@
                 </a:solidFill>
               </a:defRPr>
             </a:lvl2pPr>
-            <a:lvl3pPr marL="216073" indent="0">
-              <a:buNone/>
-              <a:defRPr sz="425">
+            <a:lvl3pPr marL="144018" indent="0">
+              <a:buNone/>
+              <a:defRPr sz="284">
                 <a:solidFill>
                   <a:schemeClr val="tx1">
                     <a:tint val="75000"/>
@@ -1283,9 +1283,9 @@
                 </a:solidFill>
               </a:defRPr>
             </a:lvl3pPr>
-            <a:lvl4pPr marL="324109" indent="0">
-              <a:buNone/>
-              <a:defRPr sz="378">
+            <a:lvl4pPr marL="216027" indent="0">
+              <a:buNone/>
+              <a:defRPr sz="252">
                 <a:solidFill>
                   <a:schemeClr val="tx1">
                     <a:tint val="75000"/>
@@ -1293,9 +1293,9 @@
                 </a:solidFill>
               </a:defRPr>
             </a:lvl4pPr>
-            <a:lvl5pPr marL="432145" indent="0">
-              <a:buNone/>
-              <a:defRPr sz="378">
+            <a:lvl5pPr marL="288036" indent="0">
+              <a:buNone/>
+              <a:defRPr sz="252">
                 <a:solidFill>
                   <a:schemeClr val="tx1">
                     <a:tint val="75000"/>
@@ -1303,9 +1303,9 @@
                 </a:solidFill>
               </a:defRPr>
             </a:lvl5pPr>
-            <a:lvl6pPr marL="540182" indent="0">
-              <a:buNone/>
-              <a:defRPr sz="378">
+            <a:lvl6pPr marL="360045" indent="0">
+              <a:buNone/>
+              <a:defRPr sz="252">
                 <a:solidFill>
                   <a:schemeClr val="tx1">
                     <a:tint val="75000"/>
@@ -1313,9 +1313,9 @@
                 </a:solidFill>
               </a:defRPr>
             </a:lvl6pPr>
-            <a:lvl7pPr marL="648218" indent="0">
-              <a:buNone/>
-              <a:defRPr sz="378">
+            <a:lvl7pPr marL="432054" indent="0">
+              <a:buNone/>
+              <a:defRPr sz="252">
                 <a:solidFill>
                   <a:schemeClr val="tx1">
                     <a:tint val="75000"/>
@@ -1323,9 +1323,9 @@
                 </a:solidFill>
               </a:defRPr>
             </a:lvl7pPr>
-            <a:lvl8pPr marL="756255" indent="0">
-              <a:buNone/>
-              <a:defRPr sz="378">
+            <a:lvl8pPr marL="504063" indent="0">
+              <a:buNone/>
+              <a:defRPr sz="252">
                 <a:solidFill>
                   <a:schemeClr val="tx1">
                     <a:tint val="75000"/>
@@ -1333,9 +1333,9 @@
                 </a:solidFill>
               </a:defRPr>
             </a:lvl8pPr>
-            <a:lvl9pPr marL="864291" indent="0">
-              <a:buNone/>
-              <a:defRPr sz="378">
+            <a:lvl9pPr marL="576072" indent="0">
+              <a:buNone/>
+              <a:defRPr sz="252">
                 <a:solidFill>
                   <a:schemeClr val="tx1">
                     <a:tint val="75000"/>
@@ -1370,7 +1370,7 @@
           <a:p>
             <a:fld id="{0B9902DC-4CBB-8F49-BEE0-02C2C3D473E5}" type="datetimeFigureOut">
               <a:rPr lang="en-US" smtClean="0"/>
-              <a:t>11/13/18</a:t>
+              <a:t>11/29/18</a:t>
             </a:fld>
             <a:endParaRPr lang="en-US"/>
           </a:p>
@@ -1421,7 +1421,7 @@
     </p:spTree>
     <p:extLst>
       <p:ext uri="{BB962C8B-B14F-4D97-AF65-F5344CB8AC3E}">
-        <p14:creationId xmlns:p14="http://schemas.microsoft.com/office/powerpoint/2010/main" val="3700016156"/>
+        <p14:creationId xmlns:p14="http://schemas.microsoft.com/office/powerpoint/2010/main" val="286970040"/>
       </p:ext>
     </p:extLst>
   </p:cSld>
@@ -1483,8 +1483,8 @@
         </p:nvSpPr>
         <p:spPr>
           <a:xfrm>
-            <a:off x="148540" y="1533187"/>
-            <a:ext cx="918250" cy="3654318"/>
+            <a:off x="98990" y="670664"/>
+            <a:ext cx="611942" cy="1598513"/>
           </a:xfrm>
         </p:spPr>
         <p:txBody>
@@ -1540,8 +1540,8 @@
         </p:nvSpPr>
         <p:spPr>
           <a:xfrm>
-            <a:off x="1093798" y="1533187"/>
-            <a:ext cx="918250" cy="3654318"/>
+            <a:off x="728931" y="670664"/>
+            <a:ext cx="611942" cy="1598513"/>
           </a:xfrm>
         </p:spPr>
         <p:txBody>
@@ -1602,7 +1602,7 @@
           <a:p>
             <a:fld id="{0B9902DC-4CBB-8F49-BEE0-02C2C3D473E5}" type="datetimeFigureOut">
               <a:rPr lang="en-US" smtClean="0"/>
-              <a:t>11/13/18</a:t>
+              <a:t>11/29/18</a:t>
             </a:fld>
             <a:endParaRPr lang="en-US"/>
           </a:p>
@@ -1653,7 +1653,7 @@
     </p:spTree>
     <p:extLst>
       <p:ext uri="{BB962C8B-B14F-4D97-AF65-F5344CB8AC3E}">
-        <p14:creationId xmlns:p14="http://schemas.microsoft.com/office/powerpoint/2010/main" val="3818212479"/>
+        <p14:creationId xmlns:p14="http://schemas.microsoft.com/office/powerpoint/2010/main" val="2214263314"/>
       </p:ext>
     </p:extLst>
   </p:cSld>
@@ -1692,8 +1692,8 @@
         </p:nvSpPr>
         <p:spPr>
           <a:xfrm>
-            <a:off x="148822" y="306639"/>
-            <a:ext cx="1863507" cy="1113227"/>
+            <a:off x="99178" y="134133"/>
+            <a:ext cx="1241882" cy="486960"/>
           </a:xfrm>
         </p:spPr>
         <p:txBody>
@@ -1720,8 +1720,8 @@
         </p:nvSpPr>
         <p:spPr>
           <a:xfrm>
-            <a:off x="148822" y="1411865"/>
-            <a:ext cx="914030" cy="691934"/>
+            <a:off x="99179" y="617594"/>
+            <a:ext cx="609129" cy="302673"/>
           </a:xfrm>
         </p:spPr>
         <p:txBody>
@@ -1729,39 +1729,39 @@
           <a:lstStyle>
             <a:lvl1pPr marL="0" indent="0">
               <a:buNone/>
-              <a:defRPr sz="567" b="1"/>
+              <a:defRPr sz="378" b="1"/>
             </a:lvl1pPr>
-            <a:lvl2pPr marL="108036" indent="0">
-              <a:buNone/>
-              <a:defRPr sz="473" b="1"/>
+            <a:lvl2pPr marL="72009" indent="0">
+              <a:buNone/>
+              <a:defRPr sz="315" b="1"/>
             </a:lvl2pPr>
-            <a:lvl3pPr marL="216073" indent="0">
-              <a:buNone/>
-              <a:defRPr sz="425" b="1"/>
+            <a:lvl3pPr marL="144018" indent="0">
+              <a:buNone/>
+              <a:defRPr sz="284" b="1"/>
             </a:lvl3pPr>
-            <a:lvl4pPr marL="324109" indent="0">
-              <a:buNone/>
-              <a:defRPr sz="378" b="1"/>
+            <a:lvl4pPr marL="216027" indent="0">
+              <a:buNone/>
+              <a:defRPr sz="252" b="1"/>
             </a:lvl4pPr>
-            <a:lvl5pPr marL="432145" indent="0">
-              <a:buNone/>
-              <a:defRPr sz="378" b="1"/>
+            <a:lvl5pPr marL="288036" indent="0">
+              <a:buNone/>
+              <a:defRPr sz="252" b="1"/>
             </a:lvl5pPr>
-            <a:lvl6pPr marL="540182" indent="0">
-              <a:buNone/>
-              <a:defRPr sz="378" b="1"/>
+            <a:lvl6pPr marL="360045" indent="0">
+              <a:buNone/>
+              <a:defRPr sz="252" b="1"/>
             </a:lvl6pPr>
-            <a:lvl7pPr marL="648218" indent="0">
-              <a:buNone/>
-              <a:defRPr sz="378" b="1"/>
+            <a:lvl7pPr marL="432054" indent="0">
+              <a:buNone/>
+              <a:defRPr sz="252" b="1"/>
             </a:lvl7pPr>
-            <a:lvl8pPr marL="756255" indent="0">
-              <a:buNone/>
-              <a:defRPr sz="378" b="1"/>
+            <a:lvl8pPr marL="504063" indent="0">
+              <a:buNone/>
+              <a:defRPr sz="252" b="1"/>
             </a:lvl8pPr>
-            <a:lvl9pPr marL="864291" indent="0">
-              <a:buNone/>
-              <a:defRPr sz="378" b="1"/>
+            <a:lvl9pPr marL="576072" indent="0">
+              <a:buNone/>
+              <a:defRPr sz="252" b="1"/>
             </a:lvl9pPr>
           </a:lstStyle>
           <a:p>
@@ -1785,8 +1785,8 @@
         </p:nvSpPr>
         <p:spPr>
           <a:xfrm>
-            <a:off x="148822" y="2103799"/>
-            <a:ext cx="914030" cy="3094372"/>
+            <a:off x="99179" y="920267"/>
+            <a:ext cx="609129" cy="1353575"/>
           </a:xfrm>
         </p:spPr>
         <p:txBody>
@@ -1842,8 +1842,8 @@
         </p:nvSpPr>
         <p:spPr>
           <a:xfrm>
-            <a:off x="1093798" y="1411865"/>
-            <a:ext cx="918531" cy="691934"/>
+            <a:off x="728931" y="617594"/>
+            <a:ext cx="612129" cy="302673"/>
           </a:xfrm>
         </p:spPr>
         <p:txBody>
@@ -1851,39 +1851,39 @@
           <a:lstStyle>
             <a:lvl1pPr marL="0" indent="0">
               <a:buNone/>
-              <a:defRPr sz="567" b="1"/>
+              <a:defRPr sz="378" b="1"/>
             </a:lvl1pPr>
-            <a:lvl2pPr marL="108036" indent="0">
-              <a:buNone/>
-              <a:defRPr sz="473" b="1"/>
+            <a:lvl2pPr marL="72009" indent="0">
+              <a:buNone/>
+              <a:defRPr sz="315" b="1"/>
             </a:lvl2pPr>
-            <a:lvl3pPr marL="216073" indent="0">
-              <a:buNone/>
-              <a:defRPr sz="425" b="1"/>
+            <a:lvl3pPr marL="144018" indent="0">
+              <a:buNone/>
+              <a:defRPr sz="284" b="1"/>
             </a:lvl3pPr>
-            <a:lvl4pPr marL="324109" indent="0">
-              <a:buNone/>
-              <a:defRPr sz="378" b="1"/>
+            <a:lvl4pPr marL="216027" indent="0">
+              <a:buNone/>
+              <a:defRPr sz="252" b="1"/>
             </a:lvl4pPr>
-            <a:lvl5pPr marL="432145" indent="0">
-              <a:buNone/>
-              <a:defRPr sz="378" b="1"/>
+            <a:lvl5pPr marL="288036" indent="0">
+              <a:buNone/>
+              <a:defRPr sz="252" b="1"/>
             </a:lvl5pPr>
-            <a:lvl6pPr marL="540182" indent="0">
-              <a:buNone/>
-              <a:defRPr sz="378" b="1"/>
+            <a:lvl6pPr marL="360045" indent="0">
+              <a:buNone/>
+              <a:defRPr sz="252" b="1"/>
             </a:lvl6pPr>
-            <a:lvl7pPr marL="648218" indent="0">
-              <a:buNone/>
-              <a:defRPr sz="378" b="1"/>
+            <a:lvl7pPr marL="432054" indent="0">
+              <a:buNone/>
+              <a:defRPr sz="252" b="1"/>
             </a:lvl7pPr>
-            <a:lvl8pPr marL="756255" indent="0">
-              <a:buNone/>
-              <a:defRPr sz="378" b="1"/>
+            <a:lvl8pPr marL="504063" indent="0">
+              <a:buNone/>
+              <a:defRPr sz="252" b="1"/>
             </a:lvl8pPr>
-            <a:lvl9pPr marL="864291" indent="0">
-              <a:buNone/>
-              <a:defRPr sz="378" b="1"/>
+            <a:lvl9pPr marL="576072" indent="0">
+              <a:buNone/>
+              <a:defRPr sz="252" b="1"/>
             </a:lvl9pPr>
           </a:lstStyle>
           <a:p>
@@ -1907,8 +1907,8 @@
         </p:nvSpPr>
         <p:spPr>
           <a:xfrm>
-            <a:off x="1093798" y="2103799"/>
-            <a:ext cx="918531" cy="3094372"/>
+            <a:off x="728931" y="920267"/>
+            <a:ext cx="612129" cy="1353575"/>
           </a:xfrm>
         </p:spPr>
         <p:txBody>
@@ -1969,7 +1969,7 @@
           <a:p>
             <a:fld id="{0B9902DC-4CBB-8F49-BEE0-02C2C3D473E5}" type="datetimeFigureOut">
               <a:rPr lang="en-US" smtClean="0"/>
-              <a:t>11/13/18</a:t>
+              <a:t>11/29/18</a:t>
             </a:fld>
             <a:endParaRPr lang="en-US"/>
           </a:p>
@@ -2020,7 +2020,7 @@
     </p:spTree>
     <p:extLst>
       <p:ext uri="{BB962C8B-B14F-4D97-AF65-F5344CB8AC3E}">
-        <p14:creationId xmlns:p14="http://schemas.microsoft.com/office/powerpoint/2010/main" val="4190805248"/>
+        <p14:creationId xmlns:p14="http://schemas.microsoft.com/office/powerpoint/2010/main" val="1553377733"/>
       </p:ext>
     </p:extLst>
   </p:cSld>
@@ -2087,7 +2087,7 @@
           <a:p>
             <a:fld id="{0B9902DC-4CBB-8F49-BEE0-02C2C3D473E5}" type="datetimeFigureOut">
               <a:rPr lang="en-US" smtClean="0"/>
-              <a:t>11/13/18</a:t>
+              <a:t>11/29/18</a:t>
             </a:fld>
             <a:endParaRPr lang="en-US"/>
           </a:p>
@@ -2138,7 +2138,7 @@
     </p:spTree>
     <p:extLst>
       <p:ext uri="{BB962C8B-B14F-4D97-AF65-F5344CB8AC3E}">
-        <p14:creationId xmlns:p14="http://schemas.microsoft.com/office/powerpoint/2010/main" val="4111860566"/>
+        <p14:creationId xmlns:p14="http://schemas.microsoft.com/office/powerpoint/2010/main" val="826276034"/>
       </p:ext>
     </p:extLst>
   </p:cSld>
@@ -2182,7 +2182,7 @@
           <a:p>
             <a:fld id="{0B9902DC-4CBB-8F49-BEE0-02C2C3D473E5}" type="datetimeFigureOut">
               <a:rPr lang="en-US" smtClean="0"/>
-              <a:t>11/13/18</a:t>
+              <a:t>11/29/18</a:t>
             </a:fld>
             <a:endParaRPr lang="en-US"/>
           </a:p>
@@ -2233,7 +2233,7 @@
     </p:spTree>
     <p:extLst>
       <p:ext uri="{BB962C8B-B14F-4D97-AF65-F5344CB8AC3E}">
-        <p14:creationId xmlns:p14="http://schemas.microsoft.com/office/powerpoint/2010/main" val="259257521"/>
+        <p14:creationId xmlns:p14="http://schemas.microsoft.com/office/powerpoint/2010/main" val="2377388549"/>
       </p:ext>
     </p:extLst>
   </p:cSld>
@@ -2272,15 +2272,15 @@
         </p:nvSpPr>
         <p:spPr>
           <a:xfrm>
-            <a:off x="148822" y="383963"/>
-            <a:ext cx="696846" cy="1343872"/>
+            <a:off x="99178" y="167958"/>
+            <a:ext cx="464393" cy="587851"/>
           </a:xfrm>
         </p:spPr>
         <p:txBody>
           <a:bodyPr anchor="b"/>
           <a:lstStyle>
             <a:lvl1pPr>
-              <a:defRPr sz="756"/>
+              <a:defRPr sz="504"/>
             </a:lvl1pPr>
           </a:lstStyle>
           <a:p>
@@ -2304,39 +2304,39 @@
         </p:nvSpPr>
         <p:spPr>
           <a:xfrm>
-            <a:off x="918531" y="829256"/>
-            <a:ext cx="1093798" cy="4092942"/>
+            <a:off x="612129" y="362742"/>
+            <a:ext cx="728931" cy="1790381"/>
           </a:xfrm>
         </p:spPr>
         <p:txBody>
           <a:bodyPr/>
           <a:lstStyle>
             <a:lvl1pPr>
-              <a:defRPr sz="756"/>
+              <a:defRPr sz="504"/>
             </a:lvl1pPr>
             <a:lvl2pPr>
-              <a:defRPr sz="662"/>
+              <a:defRPr sz="441"/>
             </a:lvl2pPr>
             <a:lvl3pPr>
-              <a:defRPr sz="567"/>
+              <a:defRPr sz="378"/>
             </a:lvl3pPr>
             <a:lvl4pPr>
-              <a:defRPr sz="473"/>
+              <a:defRPr sz="315"/>
             </a:lvl4pPr>
             <a:lvl5pPr>
-              <a:defRPr sz="473"/>
+              <a:defRPr sz="315"/>
             </a:lvl5pPr>
             <a:lvl6pPr>
-              <a:defRPr sz="473"/>
+              <a:defRPr sz="315"/>
             </a:lvl6pPr>
             <a:lvl7pPr>
-              <a:defRPr sz="473"/>
+              <a:defRPr sz="315"/>
             </a:lvl7pPr>
             <a:lvl8pPr>
-              <a:defRPr sz="473"/>
+              <a:defRPr sz="315"/>
             </a:lvl8pPr>
             <a:lvl9pPr>
-              <a:defRPr sz="473"/>
+              <a:defRPr sz="315"/>
             </a:lvl9pPr>
           </a:lstStyle>
           <a:p>
@@ -2389,8 +2389,8 @@
         </p:nvSpPr>
         <p:spPr>
           <a:xfrm>
-            <a:off x="148822" y="1727835"/>
-            <a:ext cx="696846" cy="3201028"/>
+            <a:off x="99178" y="755809"/>
+            <a:ext cx="464393" cy="1400229"/>
           </a:xfrm>
         </p:spPr>
         <p:txBody>
@@ -2398,39 +2398,39 @@
           <a:lstStyle>
             <a:lvl1pPr marL="0" indent="0">
               <a:buNone/>
-              <a:defRPr sz="378"/>
+              <a:defRPr sz="252"/>
             </a:lvl1pPr>
-            <a:lvl2pPr marL="108036" indent="0">
-              <a:buNone/>
-              <a:defRPr sz="331"/>
+            <a:lvl2pPr marL="72009" indent="0">
+              <a:buNone/>
+              <a:defRPr sz="221"/>
             </a:lvl2pPr>
-            <a:lvl3pPr marL="216073" indent="0">
-              <a:buNone/>
-              <a:defRPr sz="284"/>
+            <a:lvl3pPr marL="144018" indent="0">
+              <a:buNone/>
+              <a:defRPr sz="189"/>
             </a:lvl3pPr>
-            <a:lvl4pPr marL="324109" indent="0">
-              <a:buNone/>
-              <a:defRPr sz="236"/>
+            <a:lvl4pPr marL="216027" indent="0">
+              <a:buNone/>
+              <a:defRPr sz="158"/>
             </a:lvl4pPr>
-            <a:lvl5pPr marL="432145" indent="0">
-              <a:buNone/>
-              <a:defRPr sz="236"/>
+            <a:lvl5pPr marL="288036" indent="0">
+              <a:buNone/>
+              <a:defRPr sz="158"/>
             </a:lvl5pPr>
-            <a:lvl6pPr marL="540182" indent="0">
-              <a:buNone/>
-              <a:defRPr sz="236"/>
+            <a:lvl6pPr marL="360045" indent="0">
+              <a:buNone/>
+              <a:defRPr sz="158"/>
             </a:lvl6pPr>
-            <a:lvl7pPr marL="648218" indent="0">
-              <a:buNone/>
-              <a:defRPr sz="236"/>
+            <a:lvl7pPr marL="432054" indent="0">
+              <a:buNone/>
+              <a:defRPr sz="158"/>
             </a:lvl7pPr>
-            <a:lvl8pPr marL="756255" indent="0">
-              <a:buNone/>
-              <a:defRPr sz="236"/>
+            <a:lvl8pPr marL="504063" indent="0">
+              <a:buNone/>
+              <a:defRPr sz="158"/>
             </a:lvl8pPr>
-            <a:lvl9pPr marL="864291" indent="0">
-              <a:buNone/>
-              <a:defRPr sz="236"/>
+            <a:lvl9pPr marL="576072" indent="0">
+              <a:buNone/>
+              <a:defRPr sz="158"/>
             </a:lvl9pPr>
           </a:lstStyle>
           <a:p>
@@ -2459,7 +2459,7 @@
           <a:p>
             <a:fld id="{0B9902DC-4CBB-8F49-BEE0-02C2C3D473E5}" type="datetimeFigureOut">
               <a:rPr lang="en-US" smtClean="0"/>
-              <a:t>11/13/18</a:t>
+              <a:t>11/29/18</a:t>
             </a:fld>
             <a:endParaRPr lang="en-US"/>
           </a:p>
@@ -2510,7 +2510,7 @@
     </p:spTree>
     <p:extLst>
       <p:ext uri="{BB962C8B-B14F-4D97-AF65-F5344CB8AC3E}">
-        <p14:creationId xmlns:p14="http://schemas.microsoft.com/office/powerpoint/2010/main" val="3764728042"/>
+        <p14:creationId xmlns:p14="http://schemas.microsoft.com/office/powerpoint/2010/main" val="2616755218"/>
       </p:ext>
     </p:extLst>
   </p:cSld>
@@ -2549,15 +2549,15 @@
         </p:nvSpPr>
         <p:spPr>
           <a:xfrm>
-            <a:off x="148822" y="383963"/>
-            <a:ext cx="696846" cy="1343872"/>
+            <a:off x="99178" y="167958"/>
+            <a:ext cx="464393" cy="587851"/>
           </a:xfrm>
         </p:spPr>
         <p:txBody>
           <a:bodyPr anchor="b"/>
           <a:lstStyle>
             <a:lvl1pPr>
-              <a:defRPr sz="756"/>
+              <a:defRPr sz="504"/>
             </a:lvl1pPr>
           </a:lstStyle>
           <a:p>
@@ -2581,8 +2581,8 @@
         </p:nvSpPr>
         <p:spPr>
           <a:xfrm>
-            <a:off x="918531" y="829256"/>
-            <a:ext cx="1093798" cy="4092942"/>
+            <a:off x="612129" y="362742"/>
+            <a:ext cx="728931" cy="1790381"/>
           </a:xfrm>
         </p:spPr>
         <p:txBody>
@@ -2590,39 +2590,39 @@
           <a:lstStyle>
             <a:lvl1pPr marL="0" indent="0">
               <a:buNone/>
-              <a:defRPr sz="756"/>
+              <a:defRPr sz="504"/>
             </a:lvl1pPr>
-            <a:lvl2pPr marL="108036" indent="0">
-              <a:buNone/>
-              <a:defRPr sz="662"/>
+            <a:lvl2pPr marL="72009" indent="0">
+              <a:buNone/>
+              <a:defRPr sz="441"/>
             </a:lvl2pPr>
-            <a:lvl3pPr marL="216073" indent="0">
-              <a:buNone/>
-              <a:defRPr sz="567"/>
+            <a:lvl3pPr marL="144018" indent="0">
+              <a:buNone/>
+              <a:defRPr sz="378"/>
             </a:lvl3pPr>
-            <a:lvl4pPr marL="324109" indent="0">
-              <a:buNone/>
-              <a:defRPr sz="473"/>
+            <a:lvl4pPr marL="216027" indent="0">
+              <a:buNone/>
+              <a:defRPr sz="315"/>
             </a:lvl4pPr>
-            <a:lvl5pPr marL="432145" indent="0">
-              <a:buNone/>
-              <a:defRPr sz="473"/>
+            <a:lvl5pPr marL="288036" indent="0">
+              <a:buNone/>
+              <a:defRPr sz="315"/>
             </a:lvl5pPr>
-            <a:lvl6pPr marL="540182" indent="0">
-              <a:buNone/>
-              <a:defRPr sz="473"/>
+            <a:lvl6pPr marL="360045" indent="0">
+              <a:buNone/>
+              <a:defRPr sz="315"/>
             </a:lvl6pPr>
-            <a:lvl7pPr marL="648218" indent="0">
-              <a:buNone/>
-              <a:defRPr sz="473"/>
+            <a:lvl7pPr marL="432054" indent="0">
+              <a:buNone/>
+              <a:defRPr sz="315"/>
             </a:lvl7pPr>
-            <a:lvl8pPr marL="756255" indent="0">
-              <a:buNone/>
-              <a:defRPr sz="473"/>
+            <a:lvl8pPr marL="504063" indent="0">
+              <a:buNone/>
+              <a:defRPr sz="315"/>
             </a:lvl8pPr>
-            <a:lvl9pPr marL="864291" indent="0">
-              <a:buNone/>
-              <a:defRPr sz="473"/>
+            <a:lvl9pPr marL="576072" indent="0">
+              <a:buNone/>
+              <a:defRPr sz="315"/>
             </a:lvl9pPr>
           </a:lstStyle>
           <a:p>
@@ -2646,8 +2646,8 @@
         </p:nvSpPr>
         <p:spPr>
           <a:xfrm>
-            <a:off x="148822" y="1727835"/>
-            <a:ext cx="696846" cy="3201028"/>
+            <a:off x="99178" y="755809"/>
+            <a:ext cx="464393" cy="1400229"/>
           </a:xfrm>
         </p:spPr>
         <p:txBody>
@@ -2655,39 +2655,39 @@
           <a:lstStyle>
             <a:lvl1pPr marL="0" indent="0">
               <a:buNone/>
-              <a:defRPr sz="378"/>
+              <a:defRPr sz="252"/>
             </a:lvl1pPr>
-            <a:lvl2pPr marL="108036" indent="0">
-              <a:buNone/>
-              <a:defRPr sz="331"/>
+            <a:lvl2pPr marL="72009" indent="0">
+              <a:buNone/>
+              <a:defRPr sz="221"/>
             </a:lvl2pPr>
-            <a:lvl3pPr marL="216073" indent="0">
-              <a:buNone/>
-              <a:defRPr sz="284"/>
+            <a:lvl3pPr marL="144018" indent="0">
+              <a:buNone/>
+              <a:defRPr sz="189"/>
             </a:lvl3pPr>
-            <a:lvl4pPr marL="324109" indent="0">
-              <a:buNone/>
-              <a:defRPr sz="236"/>
+            <a:lvl4pPr marL="216027" indent="0">
+              <a:buNone/>
+              <a:defRPr sz="158"/>
             </a:lvl4pPr>
-            <a:lvl5pPr marL="432145" indent="0">
-              <a:buNone/>
-              <a:defRPr sz="236"/>
+            <a:lvl5pPr marL="288036" indent="0">
+              <a:buNone/>
+              <a:defRPr sz="158"/>
             </a:lvl5pPr>
-            <a:lvl6pPr marL="540182" indent="0">
-              <a:buNone/>
-              <a:defRPr sz="236"/>
+            <a:lvl6pPr marL="360045" indent="0">
+              <a:buNone/>
+              <a:defRPr sz="158"/>
             </a:lvl6pPr>
-            <a:lvl7pPr marL="648218" indent="0">
-              <a:buNone/>
-              <a:defRPr sz="236"/>
+            <a:lvl7pPr marL="432054" indent="0">
+              <a:buNone/>
+              <a:defRPr sz="158"/>
             </a:lvl7pPr>
-            <a:lvl8pPr marL="756255" indent="0">
-              <a:buNone/>
-              <a:defRPr sz="236"/>
+            <a:lvl8pPr marL="504063" indent="0">
+              <a:buNone/>
+              <a:defRPr sz="158"/>
             </a:lvl8pPr>
-            <a:lvl9pPr marL="864291" indent="0">
-              <a:buNone/>
-              <a:defRPr sz="236"/>
+            <a:lvl9pPr marL="576072" indent="0">
+              <a:buNone/>
+              <a:defRPr sz="158"/>
             </a:lvl9pPr>
           </a:lstStyle>
           <a:p>
@@ -2716,7 +2716,7 @@
           <a:p>
             <a:fld id="{0B9902DC-4CBB-8F49-BEE0-02C2C3D473E5}" type="datetimeFigureOut">
               <a:rPr lang="en-US" smtClean="0"/>
-              <a:t>11/13/18</a:t>
+              <a:t>11/29/18</a:t>
             </a:fld>
             <a:endParaRPr lang="en-US"/>
           </a:p>
@@ -2767,7 +2767,7 @@
     </p:spTree>
     <p:extLst>
       <p:ext uri="{BB962C8B-B14F-4D97-AF65-F5344CB8AC3E}">
-        <p14:creationId xmlns:p14="http://schemas.microsoft.com/office/powerpoint/2010/main" val="1513877177"/>
+        <p14:creationId xmlns:p14="http://schemas.microsoft.com/office/powerpoint/2010/main" val="420830048"/>
       </p:ext>
     </p:extLst>
   </p:cSld>
@@ -2811,8 +2811,8 @@
         </p:nvSpPr>
         <p:spPr>
           <a:xfrm>
-            <a:off x="148541" y="306639"/>
-            <a:ext cx="1863507" cy="1113227"/>
+            <a:off x="98991" y="134133"/>
+            <a:ext cx="1241882" cy="486960"/>
           </a:xfrm>
           <a:prstGeom prst="rect">
             <a:avLst/>
@@ -2844,8 +2844,8 @@
         </p:nvSpPr>
         <p:spPr>
           <a:xfrm>
-            <a:off x="148541" y="1533187"/>
-            <a:ext cx="1863507" cy="3654318"/>
+            <a:off x="98991" y="670664"/>
+            <a:ext cx="1241882" cy="1598513"/>
           </a:xfrm>
           <a:prstGeom prst="rect">
             <a:avLst/>
@@ -2906,8 +2906,8 @@
         </p:nvSpPr>
         <p:spPr>
           <a:xfrm>
-            <a:off x="148541" y="5338158"/>
-            <a:ext cx="486132" cy="306637"/>
+            <a:off x="98991" y="2335077"/>
+            <a:ext cx="323969" cy="134133"/>
           </a:xfrm>
           <a:prstGeom prst="rect">
             <a:avLst/>
@@ -2917,7 +2917,7 @@
           <a:bodyPr vert="horz" lIns="91440" tIns="45720" rIns="91440" bIns="45720" rtlCol="0" anchor="ctr"/>
           <a:lstStyle>
             <a:lvl1pPr algn="l">
-              <a:defRPr sz="284">
+              <a:defRPr sz="189">
                 <a:solidFill>
                   <a:schemeClr val="tx1">
                     <a:tint val="75000"/>
@@ -2929,7 +2929,7 @@
           <a:p>
             <a:fld id="{0B9902DC-4CBB-8F49-BEE0-02C2C3D473E5}" type="datetimeFigureOut">
               <a:rPr lang="en-US" smtClean="0"/>
-              <a:t>11/13/18</a:t>
+              <a:t>11/29/18</a:t>
             </a:fld>
             <a:endParaRPr lang="en-US"/>
           </a:p>
@@ -2947,8 +2947,8 @@
         </p:nvSpPr>
         <p:spPr>
           <a:xfrm>
-            <a:off x="715695" y="5338158"/>
-            <a:ext cx="729198" cy="306637"/>
+            <a:off x="476955" y="2335077"/>
+            <a:ext cx="485954" cy="134133"/>
           </a:xfrm>
           <a:prstGeom prst="rect">
             <a:avLst/>
@@ -2958,7 +2958,7 @@
           <a:bodyPr vert="horz" lIns="91440" tIns="45720" rIns="91440" bIns="45720" rtlCol="0" anchor="ctr"/>
           <a:lstStyle>
             <a:lvl1pPr algn="ctr">
-              <a:defRPr sz="284">
+              <a:defRPr sz="189">
                 <a:solidFill>
                   <a:schemeClr val="tx1">
                     <a:tint val="75000"/>
@@ -2984,8 +2984,8 @@
         </p:nvSpPr>
         <p:spPr>
           <a:xfrm>
-            <a:off x="1525915" y="5338158"/>
-            <a:ext cx="486132" cy="306637"/>
+            <a:off x="1016903" y="2335077"/>
+            <a:ext cx="323969" cy="134133"/>
           </a:xfrm>
           <a:prstGeom prst="rect">
             <a:avLst/>
@@ -2995,7 +2995,7 @@
           <a:bodyPr vert="horz" lIns="91440" tIns="45720" rIns="91440" bIns="45720" rtlCol="0" anchor="ctr"/>
           <a:lstStyle>
             <a:lvl1pPr algn="r">
-              <a:defRPr sz="284">
+              <a:defRPr sz="189">
                 <a:solidFill>
                   <a:schemeClr val="tx1">
                     <a:tint val="75000"/>
@@ -3016,27 +3016,27 @@
     </p:spTree>
     <p:extLst>
       <p:ext uri="{BB962C8B-B14F-4D97-AF65-F5344CB8AC3E}">
-        <p14:creationId xmlns:p14="http://schemas.microsoft.com/office/powerpoint/2010/main" val="3280976955"/>
+        <p14:creationId xmlns:p14="http://schemas.microsoft.com/office/powerpoint/2010/main" val="1797159642"/>
       </p:ext>
     </p:extLst>
   </p:cSld>
   <p:clrMap bg1="lt1" tx1="dk1" bg2="lt2" tx2="dk2" accent1="accent1" accent2="accent2" accent3="accent3" accent4="accent4" accent5="accent5" accent6="accent6" hlink="hlink" folHlink="folHlink"/>
   <p:sldLayoutIdLst>
-    <p:sldLayoutId id="2147483805" r:id="rId1"/>
-    <p:sldLayoutId id="2147483806" r:id="rId2"/>
-    <p:sldLayoutId id="2147483807" r:id="rId3"/>
-    <p:sldLayoutId id="2147483808" r:id="rId4"/>
-    <p:sldLayoutId id="2147483809" r:id="rId5"/>
-    <p:sldLayoutId id="2147483810" r:id="rId6"/>
-    <p:sldLayoutId id="2147483811" r:id="rId7"/>
-    <p:sldLayoutId id="2147483812" r:id="rId8"/>
-    <p:sldLayoutId id="2147483813" r:id="rId9"/>
-    <p:sldLayoutId id="2147483814" r:id="rId10"/>
-    <p:sldLayoutId id="2147483815" r:id="rId11"/>
+    <p:sldLayoutId id="2147483853" r:id="rId1"/>
+    <p:sldLayoutId id="2147483854" r:id="rId2"/>
+    <p:sldLayoutId id="2147483855" r:id="rId3"/>
+    <p:sldLayoutId id="2147483856" r:id="rId4"/>
+    <p:sldLayoutId id="2147483857" r:id="rId5"/>
+    <p:sldLayoutId id="2147483858" r:id="rId6"/>
+    <p:sldLayoutId id="2147483859" r:id="rId7"/>
+    <p:sldLayoutId id="2147483860" r:id="rId8"/>
+    <p:sldLayoutId id="2147483861" r:id="rId9"/>
+    <p:sldLayoutId id="2147483862" r:id="rId10"/>
+    <p:sldLayoutId id="2147483863" r:id="rId11"/>
   </p:sldLayoutIdLst>
   <p:txStyles>
     <p:titleStyle>
-      <a:lvl1pPr algn="l" defTabSz="216073" rtl="0" eaLnBrk="1" latinLnBrk="0" hangingPunct="1">
+      <a:lvl1pPr algn="l" defTabSz="144018" rtl="0" eaLnBrk="1" latinLnBrk="0" hangingPunct="1">
         <a:lnSpc>
           <a:spcPct val="90000"/>
         </a:lnSpc>
@@ -3044,7 +3044,7 @@
           <a:spcPct val="0"/>
         </a:spcBef>
         <a:buNone/>
-        <a:defRPr sz="1040" kern="1200">
+        <a:defRPr sz="693" kern="1200">
           <a:solidFill>
             <a:schemeClr val="tx1"/>
           </a:solidFill>
@@ -3055,16 +3055,16 @@
       </a:lvl1pPr>
     </p:titleStyle>
     <p:bodyStyle>
-      <a:lvl1pPr marL="54018" indent="-54018" algn="l" defTabSz="216073" rtl="0" eaLnBrk="1" latinLnBrk="0" hangingPunct="1">
+      <a:lvl1pPr marL="36005" indent="-36005" algn="l" defTabSz="144018" rtl="0" eaLnBrk="1" latinLnBrk="0" hangingPunct="1">
         <a:lnSpc>
           <a:spcPct val="90000"/>
         </a:lnSpc>
         <a:spcBef>
-          <a:spcPts val="236"/>
+          <a:spcPts val="158"/>
         </a:spcBef>
         <a:buFont typeface="Arial" panose="020B0604020202020204" pitchFamily="34" charset="0"/>
         <a:buChar char="•"/>
-        <a:defRPr sz="662" kern="1200">
+        <a:defRPr sz="441" kern="1200">
           <a:solidFill>
             <a:schemeClr val="tx1"/>
           </a:solidFill>
@@ -3073,16 +3073,16 @@
           <a:cs typeface="+mn-cs"/>
         </a:defRPr>
       </a:lvl1pPr>
-      <a:lvl2pPr marL="162055" indent="-54018" algn="l" defTabSz="216073" rtl="0" eaLnBrk="1" latinLnBrk="0" hangingPunct="1">
+      <a:lvl2pPr marL="108014" indent="-36005" algn="l" defTabSz="144018" rtl="0" eaLnBrk="1" latinLnBrk="0" hangingPunct="1">
         <a:lnSpc>
           <a:spcPct val="90000"/>
         </a:lnSpc>
         <a:spcBef>
-          <a:spcPts val="118"/>
+          <a:spcPts val="79"/>
         </a:spcBef>
         <a:buFont typeface="Arial" panose="020B0604020202020204" pitchFamily="34" charset="0"/>
         <a:buChar char="•"/>
-        <a:defRPr sz="567" kern="1200">
+        <a:defRPr sz="378" kern="1200">
           <a:solidFill>
             <a:schemeClr val="tx1"/>
           </a:solidFill>
@@ -3091,16 +3091,16 @@
           <a:cs typeface="+mn-cs"/>
         </a:defRPr>
       </a:lvl2pPr>
-      <a:lvl3pPr marL="270091" indent="-54018" algn="l" defTabSz="216073" rtl="0" eaLnBrk="1" latinLnBrk="0" hangingPunct="1">
+      <a:lvl3pPr marL="180023" indent="-36005" algn="l" defTabSz="144018" rtl="0" eaLnBrk="1" latinLnBrk="0" hangingPunct="1">
         <a:lnSpc>
           <a:spcPct val="90000"/>
         </a:lnSpc>
         <a:spcBef>
-          <a:spcPts val="118"/>
+          <a:spcPts val="79"/>
         </a:spcBef>
         <a:buFont typeface="Arial" panose="020B0604020202020204" pitchFamily="34" charset="0"/>
         <a:buChar char="•"/>
-        <a:defRPr sz="473" kern="1200">
+        <a:defRPr sz="315" kern="1200">
           <a:solidFill>
             <a:schemeClr val="tx1"/>
           </a:solidFill>
@@ -3109,16 +3109,16 @@
           <a:cs typeface="+mn-cs"/>
         </a:defRPr>
       </a:lvl3pPr>
-      <a:lvl4pPr marL="378127" indent="-54018" algn="l" defTabSz="216073" rtl="0" eaLnBrk="1" latinLnBrk="0" hangingPunct="1">
+      <a:lvl4pPr marL="252032" indent="-36005" algn="l" defTabSz="144018" rtl="0" eaLnBrk="1" latinLnBrk="0" hangingPunct="1">
         <a:lnSpc>
           <a:spcPct val="90000"/>
         </a:lnSpc>
         <a:spcBef>
-          <a:spcPts val="118"/>
+          <a:spcPts val="79"/>
         </a:spcBef>
         <a:buFont typeface="Arial" panose="020B0604020202020204" pitchFamily="34" charset="0"/>
         <a:buChar char="•"/>
-        <a:defRPr sz="425" kern="1200">
+        <a:defRPr sz="284" kern="1200">
           <a:solidFill>
             <a:schemeClr val="tx1"/>
           </a:solidFill>
@@ -3127,16 +3127,16 @@
           <a:cs typeface="+mn-cs"/>
         </a:defRPr>
       </a:lvl4pPr>
-      <a:lvl5pPr marL="486164" indent="-54018" algn="l" defTabSz="216073" rtl="0" eaLnBrk="1" latinLnBrk="0" hangingPunct="1">
+      <a:lvl5pPr marL="324041" indent="-36005" algn="l" defTabSz="144018" rtl="0" eaLnBrk="1" latinLnBrk="0" hangingPunct="1">
         <a:lnSpc>
           <a:spcPct val="90000"/>
         </a:lnSpc>
         <a:spcBef>
-          <a:spcPts val="118"/>
+          <a:spcPts val="79"/>
         </a:spcBef>
         <a:buFont typeface="Arial" panose="020B0604020202020204" pitchFamily="34" charset="0"/>
         <a:buChar char="•"/>
-        <a:defRPr sz="425" kern="1200">
+        <a:defRPr sz="284" kern="1200">
           <a:solidFill>
             <a:schemeClr val="tx1"/>
           </a:solidFill>
@@ -3145,16 +3145,16 @@
           <a:cs typeface="+mn-cs"/>
         </a:defRPr>
       </a:lvl5pPr>
-      <a:lvl6pPr marL="594200" indent="-54018" algn="l" defTabSz="216073" rtl="0" eaLnBrk="1" latinLnBrk="0" hangingPunct="1">
+      <a:lvl6pPr marL="396050" indent="-36005" algn="l" defTabSz="144018" rtl="0" eaLnBrk="1" latinLnBrk="0" hangingPunct="1">
         <a:lnSpc>
           <a:spcPct val="90000"/>
         </a:lnSpc>
         <a:spcBef>
-          <a:spcPts val="118"/>
+          <a:spcPts val="79"/>
         </a:spcBef>
         <a:buFont typeface="Arial" panose="020B0604020202020204" pitchFamily="34" charset="0"/>
         <a:buChar char="•"/>
-        <a:defRPr sz="425" kern="1200">
+        <a:defRPr sz="284" kern="1200">
           <a:solidFill>
             <a:schemeClr val="tx1"/>
           </a:solidFill>
@@ -3163,16 +3163,16 @@
           <a:cs typeface="+mn-cs"/>
         </a:defRPr>
       </a:lvl6pPr>
-      <a:lvl7pPr marL="702236" indent="-54018" algn="l" defTabSz="216073" rtl="0" eaLnBrk="1" latinLnBrk="0" hangingPunct="1">
+      <a:lvl7pPr marL="468059" indent="-36005" algn="l" defTabSz="144018" rtl="0" eaLnBrk="1" latinLnBrk="0" hangingPunct="1">
         <a:lnSpc>
           <a:spcPct val="90000"/>
         </a:lnSpc>
         <a:spcBef>
-          <a:spcPts val="118"/>
+          <a:spcPts val="79"/>
         </a:spcBef>
         <a:buFont typeface="Arial" panose="020B0604020202020204" pitchFamily="34" charset="0"/>
         <a:buChar char="•"/>
-        <a:defRPr sz="425" kern="1200">
+        <a:defRPr sz="284" kern="1200">
           <a:solidFill>
             <a:schemeClr val="tx1"/>
           </a:solidFill>
@@ -3181,16 +3181,16 @@
           <a:cs typeface="+mn-cs"/>
         </a:defRPr>
       </a:lvl7pPr>
-      <a:lvl8pPr marL="810273" indent="-54018" algn="l" defTabSz="216073" rtl="0" eaLnBrk="1" latinLnBrk="0" hangingPunct="1">
+      <a:lvl8pPr marL="540068" indent="-36005" algn="l" defTabSz="144018" rtl="0" eaLnBrk="1" latinLnBrk="0" hangingPunct="1">
         <a:lnSpc>
           <a:spcPct val="90000"/>
         </a:lnSpc>
         <a:spcBef>
-          <a:spcPts val="118"/>
+          <a:spcPts val="79"/>
         </a:spcBef>
         <a:buFont typeface="Arial" panose="020B0604020202020204" pitchFamily="34" charset="0"/>
         <a:buChar char="•"/>
-        <a:defRPr sz="425" kern="1200">
+        <a:defRPr sz="284" kern="1200">
           <a:solidFill>
             <a:schemeClr val="tx1"/>
           </a:solidFill>
@@ -3199,16 +3199,16 @@
           <a:cs typeface="+mn-cs"/>
         </a:defRPr>
       </a:lvl8pPr>
-      <a:lvl9pPr marL="918309" indent="-54018" algn="l" defTabSz="216073" rtl="0" eaLnBrk="1" latinLnBrk="0" hangingPunct="1">
+      <a:lvl9pPr marL="612077" indent="-36005" algn="l" defTabSz="144018" rtl="0" eaLnBrk="1" latinLnBrk="0" hangingPunct="1">
         <a:lnSpc>
           <a:spcPct val="90000"/>
         </a:lnSpc>
         <a:spcBef>
-          <a:spcPts val="118"/>
+          <a:spcPts val="79"/>
         </a:spcBef>
         <a:buFont typeface="Arial" panose="020B0604020202020204" pitchFamily="34" charset="0"/>
         <a:buChar char="•"/>
-        <a:defRPr sz="425" kern="1200">
+        <a:defRPr sz="284" kern="1200">
           <a:solidFill>
             <a:schemeClr val="tx1"/>
           </a:solidFill>
@@ -3222,8 +3222,8 @@
       <a:defPPr>
         <a:defRPr lang="en-US"/>
       </a:defPPr>
-      <a:lvl1pPr marL="0" algn="l" defTabSz="216073" rtl="0" eaLnBrk="1" latinLnBrk="0" hangingPunct="1">
-        <a:defRPr sz="425" kern="1200">
+      <a:lvl1pPr marL="0" algn="l" defTabSz="144018" rtl="0" eaLnBrk="1" latinLnBrk="0" hangingPunct="1">
+        <a:defRPr sz="284" kern="1200">
           <a:solidFill>
             <a:schemeClr val="tx1"/>
           </a:solidFill>
@@ -3232,8 +3232,8 @@
           <a:cs typeface="+mn-cs"/>
         </a:defRPr>
       </a:lvl1pPr>
-      <a:lvl2pPr marL="108036" algn="l" defTabSz="216073" rtl="0" eaLnBrk="1" latinLnBrk="0" hangingPunct="1">
-        <a:defRPr sz="425" kern="1200">
+      <a:lvl2pPr marL="72009" algn="l" defTabSz="144018" rtl="0" eaLnBrk="1" latinLnBrk="0" hangingPunct="1">
+        <a:defRPr sz="284" kern="1200">
           <a:solidFill>
             <a:schemeClr val="tx1"/>
           </a:solidFill>
@@ -3242,8 +3242,8 @@
           <a:cs typeface="+mn-cs"/>
         </a:defRPr>
       </a:lvl2pPr>
-      <a:lvl3pPr marL="216073" algn="l" defTabSz="216073" rtl="0" eaLnBrk="1" latinLnBrk="0" hangingPunct="1">
-        <a:defRPr sz="425" kern="1200">
+      <a:lvl3pPr marL="144018" algn="l" defTabSz="144018" rtl="0" eaLnBrk="1" latinLnBrk="0" hangingPunct="1">
+        <a:defRPr sz="284" kern="1200">
           <a:solidFill>
             <a:schemeClr val="tx1"/>
           </a:solidFill>
@@ -3252,8 +3252,8 @@
           <a:cs typeface="+mn-cs"/>
         </a:defRPr>
       </a:lvl3pPr>
-      <a:lvl4pPr marL="324109" algn="l" defTabSz="216073" rtl="0" eaLnBrk="1" latinLnBrk="0" hangingPunct="1">
-        <a:defRPr sz="425" kern="1200">
+      <a:lvl4pPr marL="216027" algn="l" defTabSz="144018" rtl="0" eaLnBrk="1" latinLnBrk="0" hangingPunct="1">
+        <a:defRPr sz="284" kern="1200">
           <a:solidFill>
             <a:schemeClr val="tx1"/>
           </a:solidFill>
@@ -3262,8 +3262,8 @@
           <a:cs typeface="+mn-cs"/>
         </a:defRPr>
       </a:lvl4pPr>
-      <a:lvl5pPr marL="432145" algn="l" defTabSz="216073" rtl="0" eaLnBrk="1" latinLnBrk="0" hangingPunct="1">
-        <a:defRPr sz="425" kern="1200">
+      <a:lvl5pPr marL="288036" algn="l" defTabSz="144018" rtl="0" eaLnBrk="1" latinLnBrk="0" hangingPunct="1">
+        <a:defRPr sz="284" kern="1200">
           <a:solidFill>
             <a:schemeClr val="tx1"/>
           </a:solidFill>
@@ -3272,8 +3272,8 @@
           <a:cs typeface="+mn-cs"/>
         </a:defRPr>
       </a:lvl5pPr>
-      <a:lvl6pPr marL="540182" algn="l" defTabSz="216073" rtl="0" eaLnBrk="1" latinLnBrk="0" hangingPunct="1">
-        <a:defRPr sz="425" kern="1200">
+      <a:lvl6pPr marL="360045" algn="l" defTabSz="144018" rtl="0" eaLnBrk="1" latinLnBrk="0" hangingPunct="1">
+        <a:defRPr sz="284" kern="1200">
           <a:solidFill>
             <a:schemeClr val="tx1"/>
           </a:solidFill>
@@ -3282,8 +3282,8 @@
           <a:cs typeface="+mn-cs"/>
         </a:defRPr>
       </a:lvl6pPr>
-      <a:lvl7pPr marL="648218" algn="l" defTabSz="216073" rtl="0" eaLnBrk="1" latinLnBrk="0" hangingPunct="1">
-        <a:defRPr sz="425" kern="1200">
+      <a:lvl7pPr marL="432054" algn="l" defTabSz="144018" rtl="0" eaLnBrk="1" latinLnBrk="0" hangingPunct="1">
+        <a:defRPr sz="284" kern="1200">
           <a:solidFill>
             <a:schemeClr val="tx1"/>
           </a:solidFill>
@@ -3292,8 +3292,8 @@
           <a:cs typeface="+mn-cs"/>
         </a:defRPr>
       </a:lvl7pPr>
-      <a:lvl8pPr marL="756255" algn="l" defTabSz="216073" rtl="0" eaLnBrk="1" latinLnBrk="0" hangingPunct="1">
-        <a:defRPr sz="425" kern="1200">
+      <a:lvl8pPr marL="504063" algn="l" defTabSz="144018" rtl="0" eaLnBrk="1" latinLnBrk="0" hangingPunct="1">
+        <a:defRPr sz="284" kern="1200">
           <a:solidFill>
             <a:schemeClr val="tx1"/>
           </a:solidFill>
@@ -3302,8 +3302,8 @@
           <a:cs typeface="+mn-cs"/>
         </a:defRPr>
       </a:lvl8pPr>
-      <a:lvl9pPr marL="864291" algn="l" defTabSz="216073" rtl="0" eaLnBrk="1" latinLnBrk="0" hangingPunct="1">
-        <a:defRPr sz="425" kern="1200">
+      <a:lvl9pPr marL="576072" algn="l" defTabSz="144018" rtl="0" eaLnBrk="1" latinLnBrk="0" hangingPunct="1">
+        <a:defRPr sz="284" kern="1200">
           <a:solidFill>
             <a:schemeClr val="tx1"/>
           </a:solidFill>
@@ -3336,10 +3336,10 @@
       </p:grpSpPr>
       <p:pic>
         <p:nvPicPr>
-          <p:cNvPr id="8" name="Picture 7">
+          <p:cNvPr id="5" name="Picture 4">
             <a:extLst>
               <a:ext uri="{FF2B5EF4-FFF2-40B4-BE49-F238E27FC236}">
-                <a16:creationId xmlns:a16="http://schemas.microsoft.com/office/drawing/2014/main" id="{125CA916-3D09-BA4D-BA32-83836095270E}"/>
+                <a16:creationId xmlns:a16="http://schemas.microsoft.com/office/drawing/2014/main" id="{A04F10EB-FC5C-2443-A301-31B63A8DD2A0}"/>
               </a:ext>
             </a:extLst>
           </p:cNvPr>
@@ -3350,13 +3350,13 @@
         </p:nvPicPr>
         <p:blipFill rotWithShape="1">
           <a:blip r:embed="rId2"/>
-          <a:srcRect r="49908"/>
+          <a:srcRect r="49951"/>
           <a:stretch/>
         </p:blipFill>
         <p:spPr>
           <a:xfrm>
-            <a:off x="83529" y="2094194"/>
-            <a:ext cx="1972848" cy="1670865"/>
+            <a:off x="106729" y="78900"/>
+            <a:ext cx="1225269" cy="1038602"/>
           </a:xfrm>
           <a:prstGeom prst="rect">
             <a:avLst/>
@@ -3365,138 +3365,10 @@
       </p:pic>
       <p:pic>
         <p:nvPicPr>
-          <p:cNvPr id="11" name="Picture 10">
+          <p:cNvPr id="9" name="Picture 8">
             <a:extLst>
               <a:ext uri="{FF2B5EF4-FFF2-40B4-BE49-F238E27FC236}">
-                <a16:creationId xmlns:a16="http://schemas.microsoft.com/office/drawing/2014/main" id="{794B0240-9250-2447-9E61-780198AF521C}"/>
-              </a:ext>
-            </a:extLst>
-          </p:cNvPr>
-          <p:cNvPicPr>
-            <a:picLocks noChangeAspect="1"/>
-          </p:cNvPicPr>
-          <p:nvPr/>
-        </p:nvPicPr>
-        <p:blipFill rotWithShape="1">
-          <a:blip r:embed="rId2"/>
-          <a:srcRect l="50442"/>
-          <a:stretch/>
-        </p:blipFill>
-        <p:spPr>
-          <a:xfrm>
-            <a:off x="208770" y="3857526"/>
-            <a:ext cx="1951817" cy="1670865"/>
-          </a:xfrm>
-          <a:prstGeom prst="rect">
-            <a:avLst/>
-          </a:prstGeom>
-        </p:spPr>
-      </p:pic>
-      <p:sp>
-        <p:nvSpPr>
-          <p:cNvPr id="2" name="TextBox 1"/>
-          <p:cNvSpPr txBox="1"/>
-          <p:nvPr/>
-        </p:nvSpPr>
-        <p:spPr>
-          <a:xfrm>
-            <a:off x="-314" y="128053"/>
-            <a:ext cx="328409" cy="276999"/>
-          </a:xfrm>
-          <a:prstGeom prst="rect">
-            <a:avLst/>
-          </a:prstGeom>
-          <a:noFill/>
-        </p:spPr>
-        <p:txBody>
-          <a:bodyPr wrap="square" rtlCol="0">
-            <a:spAutoFit/>
-          </a:bodyPr>
-          <a:lstStyle/>
-          <a:p>
-            <a:r>
-              <a:rPr lang="en-US" sz="1200" b="1" dirty="0"/>
-              <a:t>A.</a:t>
-            </a:r>
-          </a:p>
-        </p:txBody>
-      </p:sp>
-      <p:sp>
-        <p:nvSpPr>
-          <p:cNvPr id="6" name="TextBox 5">
-            <a:extLst>
-              <a:ext uri="{FF2B5EF4-FFF2-40B4-BE49-F238E27FC236}">
-                <a16:creationId xmlns:a16="http://schemas.microsoft.com/office/drawing/2014/main" id="{C880D25E-9F8B-5148-9BFF-4A376DCC8218}"/>
-              </a:ext>
-            </a:extLst>
-          </p:cNvPr>
-          <p:cNvSpPr txBox="1"/>
-          <p:nvPr/>
-        </p:nvSpPr>
-        <p:spPr>
-          <a:xfrm>
-            <a:off x="-28500" y="2001727"/>
-            <a:ext cx="499555" cy="276999"/>
-          </a:xfrm>
-          <a:prstGeom prst="rect">
-            <a:avLst/>
-          </a:prstGeom>
-          <a:noFill/>
-        </p:spPr>
-        <p:txBody>
-          <a:bodyPr wrap="square" rtlCol="0">
-            <a:spAutoFit/>
-          </a:bodyPr>
-          <a:lstStyle/>
-          <a:p>
-            <a:r>
-              <a:rPr lang="en-US" sz="1200" b="1" dirty="0"/>
-              <a:t>B.</a:t>
-            </a:r>
-          </a:p>
-        </p:txBody>
-      </p:sp>
-      <p:sp>
-        <p:nvSpPr>
-          <p:cNvPr id="10" name="TextBox 9">
-            <a:extLst>
-              <a:ext uri="{FF2B5EF4-FFF2-40B4-BE49-F238E27FC236}">
-                <a16:creationId xmlns:a16="http://schemas.microsoft.com/office/drawing/2014/main" id="{0D765AB3-F24A-0647-90FA-132A537756C9}"/>
-              </a:ext>
-            </a:extLst>
-          </p:cNvPr>
-          <p:cNvSpPr txBox="1"/>
-          <p:nvPr/>
-        </p:nvSpPr>
-        <p:spPr>
-          <a:xfrm>
-            <a:off x="-314" y="3732933"/>
-            <a:ext cx="320419" cy="276999"/>
-          </a:xfrm>
-          <a:prstGeom prst="rect">
-            <a:avLst/>
-          </a:prstGeom>
-          <a:noFill/>
-        </p:spPr>
-        <p:txBody>
-          <a:bodyPr wrap="square" rtlCol="0">
-            <a:spAutoFit/>
-          </a:bodyPr>
-          <a:lstStyle/>
-          <a:p>
-            <a:r>
-              <a:rPr lang="en-US" sz="1200" b="1" dirty="0"/>
-              <a:t>C.</a:t>
-            </a:r>
-          </a:p>
-        </p:txBody>
-      </p:sp>
-      <p:pic>
-        <p:nvPicPr>
-          <p:cNvPr id="4" name="Picture 3">
-            <a:extLst>
-              <a:ext uri="{FF2B5EF4-FFF2-40B4-BE49-F238E27FC236}">
-                <a16:creationId xmlns:a16="http://schemas.microsoft.com/office/drawing/2014/main" id="{1EA2B296-617E-3C4F-B738-9C56CFC0DD91}"/>
+                <a16:creationId xmlns:a16="http://schemas.microsoft.com/office/drawing/2014/main" id="{909EF2DF-18B7-2B4B-A434-BB43F444D983}"/>
               </a:ext>
             </a:extLst>
           </p:cNvPr>
@@ -3507,19 +3379,83 @@
         </p:nvPicPr>
         <p:blipFill rotWithShape="1">
           <a:blip r:embed="rId3"/>
-          <a:srcRect l="16916" t="7783" r="21180" b="23358"/>
+          <a:srcRect l="49953"/>
           <a:stretch/>
         </p:blipFill>
         <p:spPr>
           <a:xfrm>
-            <a:off x="328096" y="128053"/>
-            <a:ext cx="1655803" cy="1841818"/>
+            <a:off x="106729" y="1164177"/>
+            <a:ext cx="1225203" cy="1038602"/>
           </a:xfrm>
           <a:prstGeom prst="rect">
             <a:avLst/>
           </a:prstGeom>
         </p:spPr>
       </p:pic>
+      <p:sp>
+        <p:nvSpPr>
+          <p:cNvPr id="2" name="TextBox 1"/>
+          <p:cNvSpPr txBox="1"/>
+          <p:nvPr/>
+        </p:nvSpPr>
+        <p:spPr>
+          <a:xfrm>
+            <a:off x="38144" y="32225"/>
+            <a:ext cx="292055" cy="184666"/>
+          </a:xfrm>
+          <a:prstGeom prst="rect">
+            <a:avLst/>
+          </a:prstGeom>
+          <a:noFill/>
+        </p:spPr>
+        <p:txBody>
+          <a:bodyPr wrap="square" rtlCol="0">
+            <a:spAutoFit/>
+          </a:bodyPr>
+          <a:lstStyle/>
+          <a:p>
+            <a:r>
+              <a:rPr lang="en-US" sz="600" b="1" dirty="0"/>
+              <a:t>A.</a:t>
+            </a:r>
+          </a:p>
+        </p:txBody>
+      </p:sp>
+      <p:sp>
+        <p:nvSpPr>
+          <p:cNvPr id="7" name="TextBox 6">
+            <a:extLst>
+              <a:ext uri="{FF2B5EF4-FFF2-40B4-BE49-F238E27FC236}">
+                <a16:creationId xmlns:a16="http://schemas.microsoft.com/office/drawing/2014/main" id="{5298C5BF-9D1C-474B-9F31-EC87AC423682}"/>
+              </a:ext>
+            </a:extLst>
+          </p:cNvPr>
+          <p:cNvSpPr txBox="1"/>
+          <p:nvPr/>
+        </p:nvSpPr>
+        <p:spPr>
+          <a:xfrm>
+            <a:off x="38144" y="1117502"/>
+            <a:ext cx="292055" cy="184666"/>
+          </a:xfrm>
+          <a:prstGeom prst="rect">
+            <a:avLst/>
+          </a:prstGeom>
+          <a:noFill/>
+        </p:spPr>
+        <p:txBody>
+          <a:bodyPr wrap="square" rtlCol="0">
+            <a:spAutoFit/>
+          </a:bodyPr>
+          <a:lstStyle/>
+          <a:p>
+            <a:r>
+              <a:rPr lang="en-US" sz="600" b="1" dirty="0"/>
+              <a:t>B.</a:t>
+            </a:r>
+          </a:p>
+        </p:txBody>
+      </p:sp>
     </p:spTree>
     <p:extLst>
       <p:ext uri="{BB962C8B-B14F-4D97-AF65-F5344CB8AC3E}">

</xml_diff>